<commit_message>
publish term project with CPU simulation model
</commit_message>
<xml_diff>
--- a/Lectures/term_project/term_proj.pptx
+++ b/Lectures/term_project/term_proj.pptx
@@ -9,6 +9,7 @@
     <p:sldId id="257" r:id="rId3"/>
     <p:sldId id="258" r:id="rId4"/>
     <p:sldId id="259" r:id="rId5"/>
+    <p:sldId id="260" r:id="rId6"/>
   </p:sldIdLst>
   <p:sldSz cx="9144000" cy="6858000" type="screen4x3"/>
   <p:notesSz cx="6858000" cy="9144000"/>
@@ -4308,11 +4309,22 @@
             </a:pPr>
             <a:r>
               <a:rPr lang="en-US" altLang="zh-TW" sz="2000" dirty="0" smtClean="0"/>
-              <a:t>Instructions and memory data are </a:t>
+              <a:t>Examine </a:t>
             </a:r>
             <a:r>
               <a:rPr lang="en-US" altLang="zh-TW" sz="2000" dirty="0" smtClean="0"/>
-              <a:t>sent from input ports</a:t>
+              <a:t>each instruction at least once</a:t>
+            </a:r>
+          </a:p>
+          <a:p>
+            <a:pPr eaLnBrk="1" hangingPunct="1">
+              <a:lnSpc>
+                <a:spcPct val="80000"/>
+              </a:lnSpc>
+            </a:pPr>
+            <a:r>
+              <a:rPr lang="en-US" altLang="zh-TW" sz="2800" dirty="0" smtClean="0"/>
+              <a:t>Basic Stage 2 (+10%) extend with branch control unit</a:t>
             </a:r>
           </a:p>
           <a:p>
@@ -4322,8 +4334,8 @@
               </a:lnSpc>
             </a:pPr>
             <a:r>
-              <a:rPr lang="en-US" altLang="zh-TW" sz="2000" dirty="0" smtClean="0"/>
-              <a:t>Examine each instruction at least once</a:t>
+              <a:rPr lang="en-US" altLang="zh-TW" sz="2400" dirty="0" smtClean="0"/>
+              <a:t>Show you can execute Jump, BRN, BRZ instructions</a:t>
             </a:r>
           </a:p>
           <a:p>
@@ -4334,31 +4346,8 @@
             </a:pPr>
             <a:r>
               <a:rPr lang="en-US" altLang="zh-TW" sz="2800" dirty="0" smtClean="0"/>
-              <a:t>Basic Stage 2 (+10%) extend with branch control unit</a:t>
-            </a:r>
-          </a:p>
-          <a:p>
-            <a:pPr lvl="1" eaLnBrk="1" hangingPunct="1">
-              <a:lnSpc>
-                <a:spcPct val="80000"/>
-              </a:lnSpc>
-            </a:pPr>
-            <a:r>
-              <a:rPr lang="en-US" altLang="zh-TW" sz="2400" dirty="0" smtClean="0"/>
-              <a:t>Show you can execute Jump, BRN, BRZ instructions</a:t>
-            </a:r>
-          </a:p>
-          <a:p>
-            <a:pPr eaLnBrk="1" hangingPunct="1">
-              <a:lnSpc>
-                <a:spcPct val="80000"/>
-              </a:lnSpc>
-            </a:pPr>
-            <a:r>
-              <a:rPr lang="en-US" altLang="zh-TW" sz="2800" dirty="0" smtClean="0"/>
               <a:t>Bonus: additional instructions</a:t>
             </a:r>
-            <a:endParaRPr lang="en-US" altLang="zh-TW" sz="2800" dirty="0" smtClean="0"/>
           </a:p>
         </p:txBody>
       </p:sp>
@@ -4500,11 +4489,7 @@
             </a:pPr>
             <a:r>
               <a:rPr lang="en-US" altLang="zh-TW" sz="2400" dirty="0" smtClean="0"/>
-              <a:t>ABS </a:t>
-            </a:r>
-            <a:r>
-              <a:rPr lang="en-US" altLang="zh-TW" sz="2400" dirty="0" smtClean="0"/>
-              <a:t>R1, R2 (take absolute value)</a:t>
+              <a:t>ABS R1, R2 (take absolute value)</a:t>
             </a:r>
           </a:p>
           <a:p>
@@ -4634,11 +4619,7 @@
             </a:pPr>
             <a:r>
               <a:rPr lang="en-US" altLang="zh-TW" sz="2400" dirty="0" smtClean="0"/>
-              <a:t>(4) </a:t>
-            </a:r>
-            <a:r>
-              <a:rPr lang="en-US" altLang="zh-TW" sz="2400" dirty="0" smtClean="0"/>
-              <a:t>LDM R1, R2  (load with post modify)</a:t>
+              <a:t>(4) LDM R1, R2  (load with post modify)</a:t>
             </a:r>
           </a:p>
           <a:p>
@@ -4673,11 +4654,7 @@
             </a:pPr>
             <a:r>
               <a:rPr lang="en-US" altLang="zh-TW" sz="2400" dirty="0" smtClean="0"/>
-              <a:t>(5) </a:t>
-            </a:r>
-            <a:r>
-              <a:rPr lang="en-US" altLang="zh-TW" sz="2400" dirty="0" smtClean="0"/>
-              <a:t>ADM R1, R2, R3 (add with one operand in memory)</a:t>
+              <a:t>(5) ADM R1, R2, R3 (add with one operand in memory)</a:t>
             </a:r>
           </a:p>
           <a:p>
@@ -4690,7 +4667,6 @@
               <a:rPr lang="en-US" altLang="zh-TW" sz="2400" dirty="0" smtClean="0"/>
               <a:t>R1=R2+mem[R3]</a:t>
             </a:r>
-            <a:endParaRPr lang="en-US" altLang="zh-TW" sz="2400" dirty="0" smtClean="0"/>
           </a:p>
           <a:p>
             <a:pPr lvl="1" eaLnBrk="1" hangingPunct="1">
@@ -4714,6 +4690,157 @@
         </p:txBody>
       </p:sp>
     </p:spTree>
+  </p:cSld>
+  <p:clrMapOvr>
+    <a:masterClrMapping/>
+  </p:clrMapOvr>
+</p:sld>
+</file>
+
+<file path=ppt/slides/slide5.xml><?xml version="1.0" encoding="utf-8"?>
+<p:sld xmlns:a="http://schemas.openxmlformats.org/drawingml/2006/main" xmlns:r="http://schemas.openxmlformats.org/officeDocument/2006/relationships" xmlns:p="http://schemas.openxmlformats.org/presentationml/2006/main">
+  <p:cSld>
+    <p:spTree>
+      <p:nvGrpSpPr>
+        <p:cNvPr id="1" name=""/>
+        <p:cNvGrpSpPr/>
+        <p:nvPr/>
+      </p:nvGrpSpPr>
+      <p:grpSpPr>
+        <a:xfrm>
+          <a:off x="0" y="0"/>
+          <a:ext cx="0" cy="0"/>
+          <a:chOff x="0" y="0"/>
+          <a:chExt cx="0" cy="0"/>
+        </a:xfrm>
+      </p:grpSpPr>
+      <p:sp>
+        <p:nvSpPr>
+          <p:cNvPr id="2" name="標題 1"/>
+          <p:cNvSpPr>
+            <a:spLocks noGrp="1"/>
+          </p:cNvSpPr>
+          <p:nvPr>
+            <p:ph type="title"/>
+          </p:nvPr>
+        </p:nvSpPr>
+        <p:spPr/>
+        <p:txBody>
+          <a:bodyPr/>
+          <a:lstStyle/>
+          <a:p>
+            <a:r>
+              <a:rPr lang="en-US" altLang="zh-TW" dirty="0" smtClean="0"/>
+              <a:t>CPU Simulation Environment</a:t>
+            </a:r>
+            <a:endParaRPr lang="zh-TW" altLang="en-US" dirty="0"/>
+          </a:p>
+        </p:txBody>
+      </p:sp>
+      <p:sp>
+        <p:nvSpPr>
+          <p:cNvPr id="3" name="內容版面配置區 2"/>
+          <p:cNvSpPr>
+            <a:spLocks noGrp="1"/>
+          </p:cNvSpPr>
+          <p:nvPr>
+            <p:ph idx="1"/>
+          </p:nvPr>
+        </p:nvSpPr>
+        <p:spPr/>
+        <p:txBody>
+          <a:bodyPr/>
+          <a:lstStyle/>
+          <a:p>
+            <a:r>
+              <a:rPr lang="en-US" altLang="zh-TW" sz="2800" dirty="0" smtClean="0"/>
+              <a:t>Sub-folder “</a:t>
+            </a:r>
+            <a:r>
+              <a:rPr lang="en-US" altLang="zh-TW" sz="2800" dirty="0" err="1" smtClean="0"/>
+              <a:t>cpu_sim_model</a:t>
+            </a:r>
+            <a:endParaRPr lang="en-US" altLang="zh-TW" sz="2800" dirty="0" smtClean="0"/>
+          </a:p>
+          <a:p>
+            <a:pPr lvl="1"/>
+            <a:r>
+              <a:rPr lang="en-US" altLang="zh-TW" sz="2400" dirty="0" err="1" smtClean="0"/>
+              <a:t>CPU.v</a:t>
+            </a:r>
+            <a:r>
+              <a:rPr lang="en-US" altLang="zh-TW" sz="2400" dirty="0" smtClean="0"/>
+              <a:t>: non-synthesizable simulation model of the CPU</a:t>
+            </a:r>
+          </a:p>
+          <a:p>
+            <a:pPr lvl="1"/>
+            <a:r>
+              <a:rPr lang="en-US" altLang="zh-TW" sz="2400" dirty="0" err="1"/>
+              <a:t>i</a:t>
+            </a:r>
+            <a:r>
+              <a:rPr lang="en-US" altLang="zh-TW" sz="2400" dirty="0" err="1" smtClean="0"/>
+              <a:t>mem.v</a:t>
+            </a:r>
+            <a:r>
+              <a:rPr lang="en-US" altLang="zh-TW" sz="2400" dirty="0" smtClean="0"/>
+              <a:t>: the program memory simulation model</a:t>
+            </a:r>
+          </a:p>
+          <a:p>
+            <a:pPr lvl="1"/>
+            <a:r>
+              <a:rPr lang="en-US" altLang="zh-TW" sz="2400" dirty="0" err="1" smtClean="0"/>
+              <a:t>dmem.v</a:t>
+            </a:r>
+            <a:r>
+              <a:rPr lang="en-US" altLang="zh-TW" sz="2400" dirty="0" smtClean="0"/>
+              <a:t>: the data memory simulation model</a:t>
+            </a:r>
+          </a:p>
+          <a:p>
+            <a:r>
+              <a:rPr lang="en-US" altLang="zh-TW" sz="2800" dirty="0" smtClean="0"/>
+              <a:t>Replace the following items</a:t>
+            </a:r>
+          </a:p>
+          <a:p>
+            <a:pPr lvl="1"/>
+            <a:r>
+              <a:rPr lang="en-US" altLang="zh-TW" sz="2400" dirty="0" smtClean="0"/>
+              <a:t>The CPU module: by your synthesizable design</a:t>
+            </a:r>
+          </a:p>
+          <a:p>
+            <a:pPr lvl="1"/>
+            <a:r>
+              <a:rPr lang="en-US" altLang="zh-TW" sz="2400" dirty="0" smtClean="0"/>
+              <a:t>imem.txt: the binary code of your test program</a:t>
+            </a:r>
+          </a:p>
+          <a:p>
+            <a:pPr lvl="1"/>
+            <a:r>
+              <a:rPr lang="en-US" altLang="zh-TW" sz="2400" dirty="0" smtClean="0"/>
+              <a:t>dmem.txt: the initial content of the data memory (bitmap)</a:t>
+            </a:r>
+          </a:p>
+          <a:p>
+            <a:pPr lvl="1"/>
+            <a:endParaRPr lang="en-US" altLang="zh-TW" sz="2400" dirty="0" smtClean="0"/>
+          </a:p>
+          <a:p>
+            <a:endParaRPr lang="zh-TW" altLang="en-US" sz="2800" dirty="0"/>
+          </a:p>
+        </p:txBody>
+      </p:sp>
+    </p:spTree>
+    <p:extLst>
+      <p:ext uri="{BB962C8B-B14F-4D97-AF65-F5344CB8AC3E}">
+        <p14:creationId xmlns:p14="http://schemas.microsoft.com/office/powerpoint/2010/main" val="1761964291"/>
+      </p:ext>
+    </p:extLst>
   </p:cSld>
   <p:clrMapOvr>
     <a:masterClrMapping/>

</xml_diff>